<commit_message>
Term Paper started. Switched to using Word document.
</commit_message>
<xml_diff>
--- a/Homework/TermProject_MAE5803/Coon_MAE5803_TermProject_Presentation.pptx
+++ b/Homework/TermProject_MAE5803/Coon_MAE5803_TermProject_Presentation.pptx
@@ -120,7 +120,7 @@
   </p:defaultTextStyle>
   <p:extLst>
     <p:ext uri="{EFAFB233-063F-42B5-8137-9DF3F51BA10A}">
-      <p15:sldGuideLst xmlns:p15="http://schemas.microsoft.com/office/powerpoint/2012/main"/>
+      <p15:sldGuideLst xmlns:p15="http://schemas.microsoft.com/office/powerpoint/2012/main" xmlns=""/>
     </p:ext>
   </p:extLst>
 </p:presentation>
@@ -257,7 +257,7 @@
           <a:p>
             <a:fld id="{8FC00AEE-47FC-42EE-B4DA-677DEA4BE54E}" type="datetimeFigureOut">
               <a:rPr lang="en-US" smtClean="0"/>
-              <a:t>4/20/17</a:t>
+              <a:t>4/21/17</a:t>
             </a:fld>
             <a:endParaRPr lang="en-US"/>
           </a:p>
@@ -427,7 +427,7 @@
           <a:p>
             <a:fld id="{8FC00AEE-47FC-42EE-B4DA-677DEA4BE54E}" type="datetimeFigureOut">
               <a:rPr lang="en-US" smtClean="0"/>
-              <a:t>4/20/17</a:t>
+              <a:t>4/21/17</a:t>
             </a:fld>
             <a:endParaRPr lang="en-US"/>
           </a:p>
@@ -607,7 +607,7 @@
           <a:p>
             <a:fld id="{8FC00AEE-47FC-42EE-B4DA-677DEA4BE54E}" type="datetimeFigureOut">
               <a:rPr lang="en-US" smtClean="0"/>
-              <a:t>4/20/17</a:t>
+              <a:t>4/21/17</a:t>
             </a:fld>
             <a:endParaRPr lang="en-US"/>
           </a:p>
@@ -777,7 +777,7 @@
           <a:p>
             <a:fld id="{8FC00AEE-47FC-42EE-B4DA-677DEA4BE54E}" type="datetimeFigureOut">
               <a:rPr lang="en-US" smtClean="0"/>
-              <a:t>4/20/17</a:t>
+              <a:t>4/21/17</a:t>
             </a:fld>
             <a:endParaRPr lang="en-US"/>
           </a:p>
@@ -1023,7 +1023,7 @@
           <a:p>
             <a:fld id="{8FC00AEE-47FC-42EE-B4DA-677DEA4BE54E}" type="datetimeFigureOut">
               <a:rPr lang="en-US" smtClean="0"/>
-              <a:t>4/20/17</a:t>
+              <a:t>4/21/17</a:t>
             </a:fld>
             <a:endParaRPr lang="en-US"/>
           </a:p>
@@ -1255,7 +1255,7 @@
           <a:p>
             <a:fld id="{8FC00AEE-47FC-42EE-B4DA-677DEA4BE54E}" type="datetimeFigureOut">
               <a:rPr lang="en-US" smtClean="0"/>
-              <a:t>4/20/17</a:t>
+              <a:t>4/21/17</a:t>
             </a:fld>
             <a:endParaRPr lang="en-US"/>
           </a:p>
@@ -1622,7 +1622,7 @@
           <a:p>
             <a:fld id="{8FC00AEE-47FC-42EE-B4DA-677DEA4BE54E}" type="datetimeFigureOut">
               <a:rPr lang="en-US" smtClean="0"/>
-              <a:t>4/20/17</a:t>
+              <a:t>4/21/17</a:t>
             </a:fld>
             <a:endParaRPr lang="en-US"/>
           </a:p>
@@ -1740,7 +1740,7 @@
           <a:p>
             <a:fld id="{8FC00AEE-47FC-42EE-B4DA-677DEA4BE54E}" type="datetimeFigureOut">
               <a:rPr lang="en-US" smtClean="0"/>
-              <a:t>4/20/17</a:t>
+              <a:t>4/21/17</a:t>
             </a:fld>
             <a:endParaRPr lang="en-US"/>
           </a:p>
@@ -1835,7 +1835,7 @@
           <a:p>
             <a:fld id="{8FC00AEE-47FC-42EE-B4DA-677DEA4BE54E}" type="datetimeFigureOut">
               <a:rPr lang="en-US" smtClean="0"/>
-              <a:t>4/20/17</a:t>
+              <a:t>4/21/17</a:t>
             </a:fld>
             <a:endParaRPr lang="en-US"/>
           </a:p>
@@ -2112,7 +2112,7 @@
           <a:p>
             <a:fld id="{8FC00AEE-47FC-42EE-B4DA-677DEA4BE54E}" type="datetimeFigureOut">
               <a:rPr lang="en-US" smtClean="0"/>
-              <a:t>4/20/17</a:t>
+              <a:t>4/21/17</a:t>
             </a:fld>
             <a:endParaRPr lang="en-US"/>
           </a:p>
@@ -2365,7 +2365,7 @@
           <a:p>
             <a:fld id="{8FC00AEE-47FC-42EE-B4DA-677DEA4BE54E}" type="datetimeFigureOut">
               <a:rPr lang="en-US" smtClean="0"/>
-              <a:t>4/20/17</a:t>
+              <a:t>4/21/17</a:t>
             </a:fld>
             <a:endParaRPr lang="en-US"/>
           </a:p>
@@ -2578,7 +2578,7 @@
           <a:p>
             <a:fld id="{8FC00AEE-47FC-42EE-B4DA-677DEA4BE54E}" type="datetimeFigureOut">
               <a:rPr lang="en-US" smtClean="0"/>
-              <a:t>4/20/17</a:t>
+              <a:t>4/21/17</a:t>
             </a:fld>
             <a:endParaRPr lang="en-US"/>
           </a:p>
@@ -3051,6 +3051,13 @@
   <p:clrMapOvr>
     <a:masterClrMapping/>
   </p:clrMapOvr>
+  <p:timing>
+    <p:tnLst>
+      <p:par>
+        <p:cTn xmlns:p14="http://schemas.microsoft.com/office/powerpoint/2010/main" id="1" dur="indefinite" restart="never" nodeType="tmRoot"/>
+      </p:par>
+    </p:tnLst>
+  </p:timing>
 </p:sld>
 </file>
 
@@ -3118,9 +3125,8 @@
               </a:bodyPr>
               <a:lstStyle/>
               <a:p>
-                <a:pPr/>
                 <a14:m>
-                  <m:oMathPara xmlns:m="http://schemas.openxmlformats.org/officeDocument/2006/math">
+                  <m:oMathPara xmlns:m="http://schemas.openxmlformats.org/officeDocument/2006/math" xmlns="">
                     <m:oMathParaPr>
                       <m:jc m:val="centerGroup"/>
                     </m:oMathParaPr>
@@ -3481,7 +3487,7 @@
                   <a:buNone/>
                 </a:pPr>
                 <a14:m>
-                  <m:oMathPara xmlns:m="http://schemas.openxmlformats.org/officeDocument/2006/math">
+                  <m:oMathPara xmlns:m="http://schemas.openxmlformats.org/officeDocument/2006/math" xmlns="">
                     <m:oMathParaPr>
                       <m:jc m:val="centerGroup"/>
                     </m:oMathParaPr>
@@ -3565,7 +3571,7 @@
                   <a:buNone/>
                 </a:pPr>
                 <a14:m>
-                  <m:oMathPara xmlns:m="http://schemas.openxmlformats.org/officeDocument/2006/math">
+                  <m:oMathPara xmlns:m="http://schemas.openxmlformats.org/officeDocument/2006/math" xmlns="">
                     <m:oMathParaPr>
                       <m:jc m:val="centerGroup"/>
                     </m:oMathParaPr>
@@ -3997,7 +4003,7 @@
                   <a:buNone/>
                 </a:pPr>
                 <a14:m>
-                  <m:oMathPara xmlns:m="http://schemas.openxmlformats.org/officeDocument/2006/math">
+                  <m:oMathPara xmlns:m="http://schemas.openxmlformats.org/officeDocument/2006/math" xmlns="">
                     <m:oMathParaPr>
                       <m:jc m:val="centerGroup"/>
                     </m:oMathParaPr>
@@ -4167,7 +4173,7 @@
                   <a:buNone/>
                 </a:pPr>
                 <a14:m>
-                  <m:oMathPara xmlns:m="http://schemas.openxmlformats.org/officeDocument/2006/math">
+                  <m:oMathPara xmlns:m="http://schemas.openxmlformats.org/officeDocument/2006/math" xmlns="">
                     <m:oMathParaPr>
                       <m:jc m:val="centerGroup"/>
                     </m:oMathParaPr>
@@ -4419,7 +4425,7 @@
                   <a:t>In order to have </a:t>
                 </a:r>
                 <a14:m>
-                  <m:oMath xmlns:m="http://schemas.openxmlformats.org/officeDocument/2006/math">
+                  <m:oMath xmlns:m="http://schemas.openxmlformats.org/officeDocument/2006/math" xmlns="">
                     <m:acc>
                       <m:accPr>
                         <m:chr m:val="̇"/>
@@ -4511,9 +4517,8 @@
               </a:bodyPr>
               <a:lstStyle/>
               <a:p>
-                <a:pPr/>
                 <a14:m>
-                  <m:oMathPara xmlns:m="http://schemas.openxmlformats.org/officeDocument/2006/math">
+                  <m:oMathPara xmlns:m="http://schemas.openxmlformats.org/officeDocument/2006/math" xmlns="">
                     <m:oMathParaPr>
                       <m:jc m:val="centerGroup"/>
                     </m:oMathParaPr>
@@ -4666,9 +4671,8 @@
                 </a:endParaRPr>
               </a:p>
               <a:p>
-                <a:pPr/>
                 <a14:m>
-                  <m:oMathPara xmlns:m="http://schemas.openxmlformats.org/officeDocument/2006/math">
+                  <m:oMathPara xmlns:m="http://schemas.openxmlformats.org/officeDocument/2006/math" xmlns="">
                     <m:oMathParaPr>
                       <m:jc m:val="centerGroup"/>
                     </m:oMathParaPr>
@@ -4800,7 +4804,7 @@
                   <a:t>                </a:t>
                 </a:r>
                 <a14:m>
-                  <m:oMath xmlns:m="http://schemas.openxmlformats.org/officeDocument/2006/math">
+                  <m:oMath xmlns:m="http://schemas.openxmlformats.org/officeDocument/2006/math" xmlns="">
                     <m:r>
                       <a:rPr lang="en-US" sz="2400" b="0" i="1" smtClean="0">
                         <a:latin typeface="Cambria Math" panose="02040503050406030204" pitchFamily="18" charset="0"/>
@@ -4921,7 +4925,7 @@
                   <a:t>For </a:t>
                 </a:r>
                 <a14:m>
-                  <m:oMath xmlns:m="http://schemas.openxmlformats.org/officeDocument/2006/math">
+                  <m:oMath xmlns:m="http://schemas.openxmlformats.org/officeDocument/2006/math" xmlns="">
                     <m:acc>
                       <m:accPr>
                         <m:chr m:val="̇"/>
@@ -4963,9 +4967,8 @@
                 </a:endParaRPr>
               </a:p>
               <a:p>
-                <a:pPr/>
                 <a14:m>
-                  <m:oMathPara xmlns:m="http://schemas.openxmlformats.org/officeDocument/2006/math">
+                  <m:oMathPara xmlns:m="http://schemas.openxmlformats.org/officeDocument/2006/math" xmlns="">
                     <m:oMathParaPr>
                       <m:jc m:val="centerGroup"/>
                     </m:oMathParaPr>
@@ -5068,9 +5071,8 @@
                 </a:endParaRPr>
               </a:p>
               <a:p>
-                <a:pPr/>
                 <a14:m>
-                  <m:oMathPara xmlns:m="http://schemas.openxmlformats.org/officeDocument/2006/math">
+                  <m:oMathPara xmlns:m="http://schemas.openxmlformats.org/officeDocument/2006/math" xmlns="">
                     <m:oMathParaPr>
                       <m:jc m:val="centerGroup"/>
                     </m:oMathParaPr>
@@ -5271,9 +5273,8 @@
               </a:bodyPr>
               <a:lstStyle/>
               <a:p>
-                <a:pPr/>
                 <a14:m>
-                  <m:oMathPara xmlns:m="http://schemas.openxmlformats.org/officeDocument/2006/math">
+                  <m:oMathPara xmlns:m="http://schemas.openxmlformats.org/officeDocument/2006/math" xmlns="">
                     <m:oMathParaPr>
                       <m:jc m:val="centerGroup"/>
                     </m:oMathParaPr>
@@ -5396,9 +5397,8 @@
               </a:bodyPr>
               <a:lstStyle/>
               <a:p>
-                <a:pPr/>
                 <a14:m>
-                  <m:oMathPara xmlns:m="http://schemas.openxmlformats.org/officeDocument/2006/math">
+                  <m:oMathPara xmlns:m="http://schemas.openxmlformats.org/officeDocument/2006/math" xmlns="">
                     <m:oMathParaPr>
                       <m:jc m:val="centerGroup"/>
                     </m:oMathParaPr>
@@ -5668,9 +5668,8 @@
               </a:bodyPr>
               <a:lstStyle/>
               <a:p>
-                <a:pPr/>
                 <a14:m>
-                  <m:oMathPara xmlns:m="http://schemas.openxmlformats.org/officeDocument/2006/math">
+                  <m:oMathPara xmlns:m="http://schemas.openxmlformats.org/officeDocument/2006/math" xmlns="">
                     <m:oMathParaPr>
                       <m:jc m:val="centerGroup"/>
                     </m:oMathParaPr>
@@ -5789,9 +5788,8 @@
               </a:bodyPr>
               <a:lstStyle/>
               <a:p>
-                <a:pPr/>
                 <a14:m>
-                  <m:oMathPara xmlns:m="http://schemas.openxmlformats.org/officeDocument/2006/math">
+                  <m:oMathPara xmlns:m="http://schemas.openxmlformats.org/officeDocument/2006/math" xmlns="">
                     <m:oMathParaPr>
                       <m:jc m:val="centerGroup"/>
                     </m:oMathParaPr>
@@ -6285,9 +6283,16 @@
       <p:transition spd="slow" p14:dur="2000"/>
     </mc:Choice>
     <mc:Fallback>
-      <p:transition spd="slow"/>
+      <p:transition xmlns:p14="http://schemas.microsoft.com/office/powerpoint/2010/main" spd="slow"/>
     </mc:Fallback>
   </mc:AlternateContent>
+  <p:timing>
+    <p:tnLst>
+      <p:par>
+        <p:cTn xmlns:p14="http://schemas.microsoft.com/office/powerpoint/2010/main" id="1" dur="indefinite" restart="never" nodeType="tmRoot"/>
+      </p:par>
+    </p:tnLst>
+  </p:timing>
 </p:sld>
 </file>
 
@@ -6371,7 +6376,7 @@
         </p:blipFill>
         <p:spPr>
           <a:xfrm>
-            <a:off x="1170485" y="4695164"/>
+            <a:off x="1170485" y="4710844"/>
             <a:ext cx="4066286" cy="1966286"/>
           </a:xfrm>
           <a:prstGeom prst="rect">
@@ -6634,9 +6639,8 @@
               </a:bodyPr>
               <a:lstStyle/>
               <a:p>
-                <a:pPr/>
                 <a14:m>
-                  <m:oMathPara xmlns:m="http://schemas.openxmlformats.org/officeDocument/2006/math">
+                  <m:oMathPara xmlns:m="http://schemas.openxmlformats.org/officeDocument/2006/math" xmlns="">
                     <m:oMathParaPr>
                       <m:jc m:val="centerGroup"/>
                     </m:oMathParaPr>
@@ -6755,9 +6759,8 @@
               </a:bodyPr>
               <a:lstStyle/>
               <a:p>
-                <a:pPr/>
                 <a14:m>
-                  <m:oMathPara xmlns:m="http://schemas.openxmlformats.org/officeDocument/2006/math">
+                  <m:oMathPara xmlns:m="http://schemas.openxmlformats.org/officeDocument/2006/math" xmlns="">
                     <m:oMathParaPr>
                       <m:jc m:val="centerGroup"/>
                     </m:oMathParaPr>
@@ -6928,9 +6931,8 @@
               </a:bodyPr>
               <a:lstStyle/>
               <a:p>
-                <a:pPr/>
                 <a14:m>
-                  <m:oMathPara xmlns:m="http://schemas.openxmlformats.org/officeDocument/2006/math">
+                  <m:oMathPara xmlns:m="http://schemas.openxmlformats.org/officeDocument/2006/math" xmlns="">
                     <m:oMathParaPr>
                       <m:jc m:val="centerGroup"/>
                     </m:oMathParaPr>
@@ -7176,7 +7178,7 @@
               <a:lstStyle/>
               <a:p>
                 <a14:m>
-                  <m:oMath xmlns:m="http://schemas.openxmlformats.org/officeDocument/2006/math">
+                  <m:oMath xmlns:m="http://schemas.openxmlformats.org/officeDocument/2006/math" xmlns="">
                     <m:r>
                       <m:rPr>
                         <m:nor/>
@@ -7552,9 +7554,8 @@
               </a:bodyPr>
               <a:lstStyle/>
               <a:p>
-                <a:pPr/>
                 <a14:m>
-                  <m:oMathPara xmlns:m="http://schemas.openxmlformats.org/officeDocument/2006/math">
+                  <m:oMathPara xmlns:m="http://schemas.openxmlformats.org/officeDocument/2006/math" xmlns="">
                     <m:oMathParaPr>
                       <m:jc m:val="centerGroup"/>
                     </m:oMathParaPr>
@@ -7963,9 +7964,8 @@
               </a:bodyPr>
               <a:lstStyle/>
               <a:p>
-                <a:pPr/>
                 <a14:m>
-                  <m:oMathPara xmlns:m="http://schemas.openxmlformats.org/officeDocument/2006/math">
+                  <m:oMathPara xmlns:m="http://schemas.openxmlformats.org/officeDocument/2006/math" xmlns="">
                     <m:oMathParaPr>
                       <m:jc m:val="centerGroup"/>
                     </m:oMathParaPr>
@@ -8066,9 +8066,8 @@
               </a:bodyPr>
               <a:lstStyle/>
               <a:p>
-                <a:pPr/>
                 <a14:m>
-                  <m:oMathPara xmlns:m="http://schemas.openxmlformats.org/officeDocument/2006/math">
+                  <m:oMathPara xmlns:m="http://schemas.openxmlformats.org/officeDocument/2006/math" xmlns="">
                     <m:oMathParaPr>
                       <m:jc m:val="centerGroup"/>
                     </m:oMathParaPr>
@@ -8170,9 +8169,8 @@
               </a:bodyPr>
               <a:lstStyle/>
               <a:p>
-                <a:pPr/>
                 <a14:m>
-                  <m:oMathPara xmlns:m="http://schemas.openxmlformats.org/officeDocument/2006/math">
+                  <m:oMathPara xmlns:m="http://schemas.openxmlformats.org/officeDocument/2006/math" xmlns="">
                     <m:oMathParaPr>
                       <m:jc m:val="centerGroup"/>
                     </m:oMathParaPr>
@@ -8522,9 +8520,8 @@
               </a:bodyPr>
               <a:lstStyle/>
               <a:p>
-                <a:pPr/>
                 <a14:m>
-                  <m:oMathPara xmlns:m="http://schemas.openxmlformats.org/officeDocument/2006/math">
+                  <m:oMathPara xmlns:m="http://schemas.openxmlformats.org/officeDocument/2006/math" xmlns="">
                     <m:oMathParaPr>
                       <m:jc m:val="centerGroup"/>
                     </m:oMathParaPr>
@@ -9021,7 +9018,7 @@
     </a:clrScheme>
     <a:fontScheme name="Office">
       <a:majorFont>
-        <a:latin typeface="Calibri Light" panose="020F0302020204030204"/>
+        <a:latin typeface="Calibri Light"/>
         <a:ea typeface=""/>
         <a:cs typeface=""/>
         <a:font script="Jpan" typeface="ＭＳ Ｐゴシック"/>
@@ -9056,7 +9053,7 @@
         <a:font script="Geor" typeface="Sylfaen"/>
       </a:majorFont>
       <a:minorFont>
-        <a:latin typeface="Calibri" panose="020F0502020204030204"/>
+        <a:latin typeface="Calibri"/>
         <a:ea typeface=""/>
         <a:cs typeface=""/>
         <a:font script="Jpan" typeface="ＭＳ Ｐゴシック"/>
@@ -9233,7 +9230,7 @@
   <a:extraClrSchemeLst/>
   <a:extLst>
     <a:ext uri="{05A4C25C-085E-4340-85A3-A5531E510DB2}">
-      <thm15:themeFamily xmlns:thm15="http://schemas.microsoft.com/office/thememl/2012/main" name="Office Theme" id="{62F939B6-93AF-4DB8-9C6B-D6C7DFDC589F}" vid="{4A3C46E8-61CC-4603-A589-7422A47A8E4A}"/>
+      <thm15:themeFamily xmlns:thm15="http://schemas.microsoft.com/office/thememl/2012/main" xmlns="" name="Office Theme" id="{62F939B6-93AF-4DB8-9C6B-D6C7DFDC589F}" vid="{4A3C46E8-61CC-4603-A589-7422A47A8E4A}"/>
     </a:ext>
   </a:extLst>
 </a:theme>

</xml_diff>